<commit_message>
Completed slides, now to work on demos.
</commit_message>
<xml_diff>
--- a/slides/ASPNETvNext.pptx
+++ b/slides/ASPNETvNext.pptx
@@ -6,10 +6,10 @@
     <p:sldMasterId id="2147483656" r:id="rId2"/>
   </p:sldMasterIdLst>
   <p:notesMasterIdLst>
-    <p:notesMasterId r:id="rId32"/>
+    <p:notesMasterId r:id="rId36"/>
   </p:notesMasterIdLst>
   <p:handoutMasterIdLst>
-    <p:handoutMasterId r:id="rId33"/>
+    <p:handoutMasterId r:id="rId37"/>
   </p:handoutMasterIdLst>
   <p:sldIdLst>
     <p:sldId id="676" r:id="rId3"/>
@@ -36,16 +36,20 @@
     <p:sldId id="724" r:id="rId24"/>
     <p:sldId id="725" r:id="rId25"/>
     <p:sldId id="726" r:id="rId26"/>
-    <p:sldId id="721" r:id="rId27"/>
-    <p:sldId id="722" r:id="rId28"/>
-    <p:sldId id="723" r:id="rId29"/>
-    <p:sldId id="702" r:id="rId30"/>
-    <p:sldId id="696" r:id="rId31"/>
+    <p:sldId id="728" r:id="rId27"/>
+    <p:sldId id="729" r:id="rId28"/>
+    <p:sldId id="730" r:id="rId29"/>
+    <p:sldId id="731" r:id="rId30"/>
+    <p:sldId id="721" r:id="rId31"/>
+    <p:sldId id="722" r:id="rId32"/>
+    <p:sldId id="723" r:id="rId33"/>
+    <p:sldId id="702" r:id="rId34"/>
+    <p:sldId id="696" r:id="rId35"/>
   </p:sldIdLst>
   <p:sldSz cx="9144000" cy="5143500" type="screen16x9"/>
   <p:notesSz cx="9601200" cy="7315200"/>
   <p:custDataLst>
-    <p:tags r:id="rId35"/>
+    <p:tags r:id="rId39"/>
   </p:custDataLst>
   <p:defaultTextStyle>
     <a:defPPr>
@@ -189,7 +193,7 @@
   </p:defaultTextStyle>
   <p:extLst>
     <p:ext uri="{EFAFB233-063F-42B5-8137-9DF3F51BA10A}">
-      <p15:sldGuideLst xmlns="" xmlns:p15="http://schemas.microsoft.com/office/powerpoint/2012/main">
+      <p15:sldGuideLst xmlns:p15="http://schemas.microsoft.com/office/powerpoint/2012/main" xmlns="">
         <p15:guide id="1" orient="horz" pos="1620">
           <p15:clr>
             <a:srgbClr val="A4A3A4"/>
@@ -203,7 +207,7 @@
       </p15:sldGuideLst>
     </p:ext>
     <p:ext uri="{2D200454-40CA-4A62-9FC3-DE9A4176ACB9}">
-      <p15:notesGuideLst xmlns="" xmlns:p15="http://schemas.microsoft.com/office/powerpoint/2012/main">
+      <p15:notesGuideLst xmlns:p15="http://schemas.microsoft.com/office/powerpoint/2012/main" xmlns="">
         <p15:guide id="1" orient="horz" pos="2304">
           <p15:clr>
             <a:srgbClr val="A4A3A4"/>
@@ -300,7 +304,7 @@
               <a:pPr>
                 <a:defRPr/>
               </a:pPr>
-              <a:t>10/28/14 22:47</a:t>
+              <a:t>10/29/14 19:58</a:t>
             </a:fld>
             <a:endParaRPr lang="en-US"/>
           </a:p>
@@ -515,7 +519,7 @@
               <a:pPr>
                 <a:defRPr/>
               </a:pPr>
-              <a:t>10/28/14 22:47</a:t>
+              <a:t>10/29/14 19:58</a:t>
             </a:fld>
             <a:endParaRPr lang="en-US"/>
           </a:p>
@@ -920,7 +924,7 @@
             <a:fld id="{645EDAD1-88E4-4536-AD95-0BFD82EC77E6}" type="datetime8">
               <a:rPr lang="en-US" smtClean="0"/>
               <a:pPr/>
-              <a:t>10/28/14 22:47</a:t>
+              <a:t>10/29/14 19:58</a:t>
             </a:fld>
             <a:endParaRPr lang="en-US" smtClean="0"/>
           </a:p>
@@ -10533,7 +10537,6 @@
               <a:rPr lang="en-US" kern="0" dirty="0" smtClean="0"/>
               <a:t> environment</a:t>
             </a:r>
-            <a:endParaRPr lang="en-US" kern="0" dirty="0" smtClean="0"/>
           </a:p>
         </p:txBody>
       </p:sp>
@@ -11792,7 +11795,6 @@
               <a:rPr lang="en-US" kern="0" dirty="0" smtClean="0"/>
               <a:t>Feature-v1.0 -&gt; Feature-v2.0</a:t>
             </a:r>
-            <a:endParaRPr lang="en-US" kern="0" dirty="0" smtClean="0"/>
           </a:p>
         </p:txBody>
       </p:sp>
@@ -12421,10 +12423,6 @@
               </a:rPr>
               <a:t>}</a:t>
             </a:r>
-            <a:endParaRPr lang="en-US" sz="1200" b="1" kern="0" dirty="0" smtClean="0">
-              <a:latin typeface="Consolas"/>
-              <a:cs typeface="Consolas"/>
-            </a:endParaRPr>
           </a:p>
         </p:txBody>
       </p:sp>
@@ -12846,13 +12844,8 @@
             <a:pPr lvl="1"/>
             <a:r>
               <a:rPr lang="en-US" kern="0" dirty="0" smtClean="0"/>
-              <a:t>Disk I/O dependenc</a:t>
-            </a:r>
-            <a:r>
-              <a:rPr lang="en-US" kern="0" dirty="0" smtClean="0"/>
-              <a:t>y is removed through caching</a:t>
-            </a:r>
-            <a:endParaRPr lang="en-US" kern="0" dirty="0" smtClean="0"/>
+              <a:t>Disk I/O dependency is removed through caching</a:t>
+            </a:r>
           </a:p>
         </p:txBody>
       </p:sp>
@@ -13269,7 +13262,6 @@
               <a:rPr lang="en-US" kern="0" dirty="0" smtClean="0"/>
               <a:t>Layer 4: Application (managed)</a:t>
             </a:r>
-            <a:endParaRPr lang="en-US" kern="0" dirty="0" smtClean="0"/>
           </a:p>
         </p:txBody>
       </p:sp>
@@ -13486,7 +13478,7 @@
           <a:p>
             <a:r>
               <a:rPr lang="en-US" b="1" dirty="0" smtClean="0"/>
-              <a:t>Hosting</a:t>
+              <a:t>Dependency Injection</a:t>
             </a:r>
             <a:endParaRPr lang="en-US" b="1" dirty="0"/>
           </a:p>
@@ -13503,7 +13495,7 @@
         <p:spPr bwMode="auto">
           <a:xfrm>
             <a:off x="381003" y="1063228"/>
-            <a:ext cx="8410575" cy="2168799"/>
+            <a:ext cx="8410575" cy="4754122"/>
           </a:xfrm>
           <a:prstGeom prst="rect">
             <a:avLst/>
@@ -13799,27 +13791,52 @@
           </a:lstStyle>
           <a:p>
             <a:r>
-              <a:rPr lang="en-US" b="1" i="1" kern="0" dirty="0" smtClean="0"/>
-              <a:t>Server</a:t>
-            </a:r>
-            <a:r>
               <a:rPr lang="en-US" kern="0" dirty="0" smtClean="0"/>
-              <a:t> becomes a pluggable component</a:t>
-            </a:r>
-          </a:p>
-          <a:p>
+              <a:t>DI abstractions shared across all the layers</a:t>
+            </a:r>
+          </a:p>
+          <a:p>
+            <a:pPr lvl="1"/>
             <a:r>
               <a:rPr lang="en-US" kern="0" dirty="0" smtClean="0"/>
-              <a:t>Allows for self-hosting and </a:t>
-            </a:r>
-            <a:r>
-              <a:rPr lang="en-US" b="1" i="1" kern="0" dirty="0" smtClean="0"/>
-              <a:t>standard</a:t>
-            </a:r>
+              <a:t>ASP.NET</a:t>
+            </a:r>
+          </a:p>
+          <a:p>
+            <a:pPr lvl="1"/>
             <a:r>
               <a:rPr lang="en-US" kern="0" dirty="0" smtClean="0"/>
-              <a:t> scenarios</a:t>
-            </a:r>
+              <a:t>EF7</a:t>
+            </a:r>
+          </a:p>
+          <a:p>
+            <a:r>
+              <a:rPr lang="en-US" kern="0" dirty="0" smtClean="0"/>
+              <a:t>Allows developer to pick your favorite DI container</a:t>
+            </a:r>
+          </a:p>
+          <a:p>
+            <a:pPr lvl="1"/>
+            <a:r>
+              <a:rPr lang="en-US" kern="0" dirty="0" err="1" smtClean="0"/>
+              <a:t>Ninject</a:t>
+            </a:r>
+            <a:endParaRPr lang="en-US" kern="0" dirty="0" smtClean="0"/>
+          </a:p>
+          <a:p>
+            <a:pPr lvl="1"/>
+            <a:r>
+              <a:rPr lang="en-US" kern="0" dirty="0" smtClean="0"/>
+              <a:t>Windsor</a:t>
+            </a:r>
+          </a:p>
+          <a:p>
+            <a:pPr lvl="1"/>
+            <a:r>
+              <a:rPr lang="en-US" kern="0" dirty="0" err="1" smtClean="0"/>
+              <a:t>StructureMap</a:t>
+            </a:r>
+            <a:endParaRPr lang="en-US" kern="0" dirty="0" smtClean="0"/>
           </a:p>
           <a:p>
             <a:endParaRPr lang="en-US" kern="0" dirty="0" smtClean="0"/>
@@ -13829,7 +13846,7 @@
     </p:spTree>
     <p:extLst>
       <p:ext uri="{BB962C8B-B14F-4D97-AF65-F5344CB8AC3E}">
-        <p14:creationId xmlns:p14="http://schemas.microsoft.com/office/powerpoint/2010/main" val="2992702651"/>
+        <p14:creationId xmlns:p14="http://schemas.microsoft.com/office/powerpoint/2010/main" val="178844022"/>
       </p:ext>
     </p:extLst>
   </p:cSld>
@@ -13888,7 +13905,7 @@
           <a:p>
             <a:r>
               <a:rPr lang="en-US" b="1" dirty="0" smtClean="0"/>
-              <a:t>Hosting</a:t>
+              <a:t>Dependency Injection</a:t>
             </a:r>
             <a:endParaRPr lang="en-US" b="1" dirty="0"/>
           </a:p>
@@ -13905,7 +13922,7 @@
         <p:spPr bwMode="auto">
           <a:xfrm>
             <a:off x="381003" y="1063228"/>
-            <a:ext cx="8410575" cy="3645100"/>
+            <a:ext cx="8410575" cy="1651734"/>
           </a:xfrm>
           <a:prstGeom prst="rect">
             <a:avLst/>
@@ -14201,87 +14218,35 @@
           </a:lstStyle>
           <a:p>
             <a:r>
-              <a:rPr lang="en-US" b="1" kern="0" dirty="0" err="1"/>
-              <a:t>Microsoft.AspNet.Loader.IIS</a:t>
-            </a:r>
-            <a:r>
-              <a:rPr lang="en-US" b="1" kern="0" dirty="0"/>
-              <a:t> (Helios</a:t>
-            </a:r>
-            <a:r>
-              <a:rPr lang="en-US" b="1" kern="0" dirty="0" smtClean="0"/>
-              <a:t>)</a:t>
+              <a:rPr lang="en-US" kern="0" dirty="0" smtClean="0"/>
+              <a:t>Provides </a:t>
+            </a:r>
+            <a:r>
+              <a:rPr lang="en-US" b="1" i="1" kern="0" dirty="0" smtClean="0"/>
+              <a:t>resolve-only</a:t>
+            </a:r>
+            <a:r>
+              <a:rPr lang="en-US" kern="0" dirty="0" smtClean="0"/>
+              <a:t> approach for services</a:t>
             </a:r>
           </a:p>
           <a:p>
             <a:pPr lvl="1"/>
             <a:r>
               <a:rPr lang="en-US" kern="0" dirty="0" smtClean="0"/>
-              <a:t>Integration with IIS and IIS Components</a:t>
-            </a:r>
-          </a:p>
-          <a:p>
-            <a:pPr lvl="1"/>
-            <a:r>
-              <a:rPr lang="en-US" kern="0" dirty="0" smtClean="0"/>
-              <a:t>Bypasses </a:t>
-            </a:r>
-            <a:r>
-              <a:rPr lang="en-US" kern="0" dirty="0" err="1" smtClean="0"/>
-              <a:t>System.Web</a:t>
-            </a:r>
-            <a:r>
-              <a:rPr lang="en-US" kern="0" dirty="0" smtClean="0"/>
-              <a:t> (good thing)</a:t>
-            </a:r>
-            <a:endParaRPr lang="en-US" kern="0" dirty="0"/>
-          </a:p>
-          <a:p>
-            <a:r>
-              <a:rPr lang="en-US" b="1" dirty="0" err="1"/>
-              <a:t>Microsoft.AspNet.Server.WebListener</a:t>
-            </a:r>
-            <a:r>
-              <a:rPr lang="en-US" b="1" dirty="0"/>
-              <a:t> (</a:t>
-            </a:r>
-            <a:r>
-              <a:rPr lang="en-US" b="1" dirty="0" err="1"/>
-              <a:t>WebListener</a:t>
-            </a:r>
-            <a:r>
-              <a:rPr lang="en-US" b="1" dirty="0" smtClean="0"/>
-              <a:t>)</a:t>
-            </a:r>
-          </a:p>
-          <a:p>
-            <a:pPr lvl="1"/>
-            <a:r>
-              <a:rPr lang="en-US" kern="0" dirty="0" smtClean="0"/>
-              <a:t>Uses </a:t>
-            </a:r>
-            <a:r>
-              <a:rPr lang="en-US" kern="0" dirty="0" err="1" smtClean="0"/>
-              <a:t>Http.sys</a:t>
-            </a:r>
-            <a:r>
-              <a:rPr lang="en-US" kern="0" dirty="0" smtClean="0"/>
-              <a:t> kernel driver</a:t>
-            </a:r>
-          </a:p>
-          <a:p>
-            <a:pPr lvl="1"/>
-            <a:r>
-              <a:rPr lang="en-US" kern="0" dirty="0" smtClean="0"/>
-              <a:t>Non-IIS hosting (Windows only)</a:t>
-            </a:r>
+              <a:t>Registration happens at container</a:t>
+            </a:r>
+            <a:endParaRPr lang="en-US" kern="0" dirty="0" smtClean="0"/>
+          </a:p>
+          <a:p>
+            <a:endParaRPr lang="en-US" kern="0" dirty="0" smtClean="0"/>
           </a:p>
         </p:txBody>
       </p:sp>
     </p:spTree>
     <p:extLst>
       <p:ext uri="{BB962C8B-B14F-4D97-AF65-F5344CB8AC3E}">
-        <p14:creationId xmlns:p14="http://schemas.microsoft.com/office/powerpoint/2010/main" val="1523432280"/>
+        <p14:creationId xmlns:p14="http://schemas.microsoft.com/office/powerpoint/2010/main" val="1422927372"/>
       </p:ext>
     </p:extLst>
   </p:cSld>
@@ -14340,7 +14305,7 @@
           <a:p>
             <a:r>
               <a:rPr lang="en-US" b="1" dirty="0" smtClean="0"/>
-              <a:t>Hosting</a:t>
+              <a:t>Dependency Injection</a:t>
             </a:r>
             <a:endParaRPr lang="en-US" b="1" dirty="0"/>
           </a:p>
@@ -14357,7 +14322,7 @@
         <p:spPr bwMode="auto">
           <a:xfrm>
             <a:off x="381003" y="1063228"/>
-            <a:ext cx="8410575" cy="1059777"/>
+            <a:ext cx="8410575" cy="1134670"/>
           </a:xfrm>
           <a:prstGeom prst="rect">
             <a:avLst/>
@@ -14652,21 +14617,79 @@
             </a:lvl9pPr>
           </a:lstStyle>
           <a:p>
-            <a:r>
-              <a:rPr lang="en-US" b="1" dirty="0" err="1" smtClean="0"/>
-              <a:t>Microsoft.AspNet.Server.Kestrel</a:t>
-            </a:r>
-            <a:r>
-              <a:rPr lang="en-US" b="1" dirty="0" smtClean="0"/>
-              <a:t> (Kestrel)</a:t>
-            </a:r>
+            <a:pPr marL="0" indent="0">
+              <a:buNone/>
+            </a:pPr>
             <a:endParaRPr lang="en-US" kern="0" dirty="0" smtClean="0"/>
           </a:p>
           <a:p>
-            <a:pPr lvl="1"/>
-            <a:r>
-              <a:rPr lang="en-US" kern="0" dirty="0" smtClean="0"/>
-              <a:t>Non-IIS hosting (cross platform)</a:t>
+            <a:endParaRPr lang="en-US" kern="0" dirty="0" smtClean="0"/>
+          </a:p>
+        </p:txBody>
+      </p:sp>
+      <p:pic>
+        <p:nvPicPr>
+          <p:cNvPr id="3" name="Picture 2" descr="Screen Shot 2014-10-29 at 8.01.43 PM.png"/>
+          <p:cNvPicPr>
+            <a:picLocks noChangeAspect="1"/>
+          </p:cNvPicPr>
+          <p:nvPr/>
+        </p:nvPicPr>
+        <p:blipFill>
+          <a:blip r:embed="rId4">
+            <a:extLst>
+              <a:ext uri="{28A0092B-C50C-407E-A947-70E740481C1C}">
+                <a14:useLocalDpi xmlns:a14="http://schemas.microsoft.com/office/drawing/2010/main" val="0"/>
+              </a:ext>
+            </a:extLst>
+          </a:blip>
+          <a:stretch>
+            <a:fillRect/>
+          </a:stretch>
+        </p:blipFill>
+        <p:spPr>
+          <a:xfrm>
+            <a:off x="0" y="846132"/>
+            <a:ext cx="9144000" cy="3451237"/>
+          </a:xfrm>
+          <a:prstGeom prst="rect">
+            <a:avLst/>
+          </a:prstGeom>
+        </p:spPr>
+      </p:pic>
+      <p:sp>
+        <p:nvSpPr>
+          <p:cNvPr id="4" name="TextBox 3"/>
+          <p:cNvSpPr txBox="1"/>
+          <p:nvPr/>
+        </p:nvSpPr>
+        <p:spPr>
+          <a:xfrm>
+            <a:off x="76200" y="4400550"/>
+            <a:ext cx="7129739" cy="240450"/>
+          </a:xfrm>
+          <a:prstGeom prst="rect">
+            <a:avLst/>
+          </a:prstGeom>
+          <a:noFill/>
+        </p:spPr>
+        <p:txBody>
+          <a:bodyPr wrap="none" rtlCol="0">
+            <a:spAutoFit/>
+          </a:bodyPr>
+          <a:lstStyle/>
+          <a:p>
+            <a:r>
+              <a:rPr lang="en-US" sz="1100" b="1" i="1" dirty="0"/>
+              <a:t>http://</a:t>
+            </a:r>
+            <a:r>
+              <a:rPr lang="en-US" sz="1100" b="1" i="1" dirty="0" err="1"/>
+              <a:t>aspnet.uservoice.com</a:t>
+            </a:r>
+            <a:r>
+              <a:rPr lang="en-US" sz="1100" b="1" i="1" dirty="0"/>
+              <a:t>/forums/41199-general-asp-net/suggestions/487734-put-ioc-front-and-centre</a:t>
             </a:r>
           </a:p>
         </p:txBody>
@@ -14674,7 +14697,7 @@
     </p:spTree>
     <p:extLst>
       <p:ext uri="{BB962C8B-B14F-4D97-AF65-F5344CB8AC3E}">
-        <p14:creationId xmlns:p14="http://schemas.microsoft.com/office/powerpoint/2010/main" val="3449994404"/>
+        <p14:creationId xmlns:p14="http://schemas.microsoft.com/office/powerpoint/2010/main" val="3301490821"/>
       </p:ext>
     </p:extLst>
   </p:cSld>
@@ -14733,7 +14756,7 @@
           <a:p>
             <a:r>
               <a:rPr lang="en-US" b="1" dirty="0" smtClean="0"/>
-              <a:t>Demo</a:t>
+              <a:t>Diagnostics/Logging</a:t>
             </a:r>
             <a:endParaRPr lang="en-US" b="1" dirty="0"/>
           </a:p>
@@ -14741,39 +14764,341 @@
       </p:sp>
       <p:sp>
         <p:nvSpPr>
-          <p:cNvPr id="3" name="Content Placeholder 2"/>
-          <p:cNvSpPr>
-            <a:spLocks noGrp="1"/>
+          <p:cNvPr id="5" name="Content Placeholder 2"/>
+          <p:cNvSpPr txBox="1">
+            <a:spLocks/>
           </p:cNvSpPr>
-          <p:nvPr>
-            <p:ph idx="1"/>
-          </p:nvPr>
+          <p:nvPr/>
         </p:nvSpPr>
-        <p:spPr>
+        <p:spPr bwMode="auto">
           <a:xfrm>
-            <a:off x="366714" y="2283210"/>
-            <a:ext cx="8410575" cy="769441"/>
+            <a:off x="381003" y="1063228"/>
+            <a:ext cx="8410575" cy="2759730"/>
           </a:xfrm>
+          <a:prstGeom prst="rect">
+            <a:avLst/>
+          </a:prstGeom>
+          <a:noFill/>
+          <a:ln w="9525">
+            <a:noFill/>
+            <a:miter lim="800000"/>
+            <a:headEnd/>
+            <a:tailEnd/>
+          </a:ln>
+          <a:effectLst/>
         </p:spPr>
         <p:txBody>
-          <a:bodyPr/>
-          <a:lstStyle/>
-          <a:p>
-            <a:pPr algn="ctr">
-              <a:buNone/>
-            </a:pPr>
-            <a:r>
-              <a:rPr lang="en-US" sz="4800" b="1" dirty="0" smtClean="0"/>
-              <a:t>Enough slides, let’s code.</a:t>
-            </a:r>
-            <a:endParaRPr lang="en-US" sz="2800" b="1" dirty="0" smtClean="0"/>
+          <a:bodyPr vert="horz" wrap="square" lIns="91440" tIns="45720" rIns="91440" bIns="45720" numCol="1" anchor="t" anchorCtr="0" compatLnSpc="1">
+            <a:prstTxWarp prst="textNoShape">
+              <a:avLst/>
+            </a:prstTxWarp>
+            <a:spAutoFit/>
+          </a:bodyPr>
+          <a:lstStyle>
+            <a:lvl1pPr marL="461963" indent="-461963" algn="l" rtl="0" eaLnBrk="1" fontAlgn="base" hangingPunct="1">
+              <a:lnSpc>
+                <a:spcPct val="90000"/>
+              </a:lnSpc>
+              <a:spcBef>
+                <a:spcPct val="30000"/>
+              </a:spcBef>
+              <a:spcAft>
+                <a:spcPct val="0"/>
+              </a:spcAft>
+              <a:buClr>
+                <a:schemeClr val="tx2"/>
+              </a:buClr>
+              <a:buFont typeface="Wingdings 2" pitchFamily="18" charset="2"/>
+              <a:buBlip>
+                <a:blip r:embed="rId2"/>
+              </a:buBlip>
+              <a:defRPr sz="3200">
+                <a:solidFill>
+                  <a:schemeClr val="tx1"/>
+                </a:solidFill>
+                <a:effectLst>
+                  <a:outerShdw blurRad="38100" dist="38100" dir="2700000" algn="tl">
+                    <a:srgbClr val="000000"/>
+                  </a:outerShdw>
+                </a:effectLst>
+                <a:latin typeface="+mn-lt"/>
+                <a:ea typeface="+mn-ea"/>
+                <a:cs typeface="+mn-cs"/>
+              </a:defRPr>
+            </a:lvl1pPr>
+            <a:lvl2pPr marL="850900" indent="-387350" algn="l" rtl="0" eaLnBrk="1" fontAlgn="base" hangingPunct="1">
+              <a:lnSpc>
+                <a:spcPct val="90000"/>
+              </a:lnSpc>
+              <a:spcBef>
+                <a:spcPct val="30000"/>
+              </a:spcBef>
+              <a:spcAft>
+                <a:spcPct val="0"/>
+              </a:spcAft>
+              <a:buClr>
+                <a:schemeClr val="tx2"/>
+              </a:buClr>
+              <a:buSzPct val="75000"/>
+              <a:buFont typeface="Wingdings 2" pitchFamily="18" charset="2"/>
+              <a:buBlip>
+                <a:blip r:embed="rId3"/>
+              </a:buBlip>
+              <a:defRPr sz="2800">
+                <a:solidFill>
+                  <a:schemeClr val="tx1"/>
+                </a:solidFill>
+                <a:effectLst>
+                  <a:outerShdw blurRad="38100" dist="38100" dir="2700000" algn="tl">
+                    <a:srgbClr val="000000"/>
+                  </a:outerShdw>
+                </a:effectLst>
+                <a:latin typeface="+mn-lt"/>
+              </a:defRPr>
+            </a:lvl2pPr>
+            <a:lvl3pPr marL="1257300" indent="-404813" algn="l" rtl="0" eaLnBrk="1" fontAlgn="base" hangingPunct="1">
+              <a:lnSpc>
+                <a:spcPct val="90000"/>
+              </a:lnSpc>
+              <a:spcBef>
+                <a:spcPct val="30000"/>
+              </a:spcBef>
+              <a:spcAft>
+                <a:spcPct val="0"/>
+              </a:spcAft>
+              <a:buClr>
+                <a:schemeClr val="tx2"/>
+              </a:buClr>
+              <a:buSzPct val="75000"/>
+              <a:buFont typeface="Wingdings 2" pitchFamily="18" charset="2"/>
+              <a:buBlip>
+                <a:blip r:embed="rId3"/>
+              </a:buBlip>
+              <a:defRPr sz="2400">
+                <a:solidFill>
+                  <a:schemeClr val="tx1"/>
+                </a:solidFill>
+                <a:effectLst>
+                  <a:outerShdw blurRad="38100" dist="38100" dir="2700000" algn="tl">
+                    <a:srgbClr val="000000"/>
+                  </a:outerShdw>
+                </a:effectLst>
+                <a:latin typeface="+mn-lt"/>
+              </a:defRPr>
+            </a:lvl3pPr>
+            <a:lvl4pPr marL="1655763" indent="-396875" algn="l" rtl="0" eaLnBrk="1" fontAlgn="base" hangingPunct="1">
+              <a:lnSpc>
+                <a:spcPct val="90000"/>
+              </a:lnSpc>
+              <a:spcBef>
+                <a:spcPct val="30000"/>
+              </a:spcBef>
+              <a:spcAft>
+                <a:spcPct val="0"/>
+              </a:spcAft>
+              <a:buClr>
+                <a:schemeClr val="tx2"/>
+              </a:buClr>
+              <a:buSzPct val="75000"/>
+              <a:buFont typeface="Wingdings 2" pitchFamily="18" charset="2"/>
+              <a:buBlip>
+                <a:blip r:embed="rId3"/>
+              </a:buBlip>
+              <a:defRPr sz="2000">
+                <a:solidFill>
+                  <a:schemeClr val="tx1"/>
+                </a:solidFill>
+                <a:effectLst>
+                  <a:outerShdw blurRad="38100" dist="38100" dir="2700000" algn="tl">
+                    <a:srgbClr val="000000"/>
+                  </a:outerShdw>
+                </a:effectLst>
+                <a:latin typeface="+mn-lt"/>
+              </a:defRPr>
+            </a:lvl4pPr>
+            <a:lvl5pPr marL="2052638" indent="-395288" algn="l" rtl="0" eaLnBrk="1" fontAlgn="base" hangingPunct="1">
+              <a:lnSpc>
+                <a:spcPct val="90000"/>
+              </a:lnSpc>
+              <a:spcBef>
+                <a:spcPct val="30000"/>
+              </a:spcBef>
+              <a:spcAft>
+                <a:spcPct val="0"/>
+              </a:spcAft>
+              <a:buClr>
+                <a:schemeClr val="tx2"/>
+              </a:buClr>
+              <a:buSzPct val="75000"/>
+              <a:buFont typeface="Wingdings 2" pitchFamily="18" charset="2"/>
+              <a:buBlip>
+                <a:blip r:embed="rId3"/>
+              </a:buBlip>
+              <a:defRPr sz="2000">
+                <a:solidFill>
+                  <a:schemeClr val="tx1"/>
+                </a:solidFill>
+                <a:effectLst>
+                  <a:outerShdw blurRad="38100" dist="38100" dir="2700000" algn="tl">
+                    <a:srgbClr val="000000"/>
+                  </a:outerShdw>
+                </a:effectLst>
+                <a:latin typeface="+mn-lt"/>
+              </a:defRPr>
+            </a:lvl5pPr>
+            <a:lvl6pPr marL="2509838" indent="-395288" algn="l" rtl="0" eaLnBrk="1" fontAlgn="base" hangingPunct="1">
+              <a:lnSpc>
+                <a:spcPct val="90000"/>
+              </a:lnSpc>
+              <a:spcBef>
+                <a:spcPct val="30000"/>
+              </a:spcBef>
+              <a:spcAft>
+                <a:spcPct val="0"/>
+              </a:spcAft>
+              <a:buClr>
+                <a:schemeClr val="tx2"/>
+              </a:buClr>
+              <a:buSzPct val="75000"/>
+              <a:buFont typeface="Wingdings 2" pitchFamily="18" charset="2"/>
+              <a:buBlip>
+                <a:blip r:embed="rId3"/>
+              </a:buBlip>
+              <a:defRPr sz="2000">
+                <a:solidFill>
+                  <a:schemeClr val="tx1"/>
+                </a:solidFill>
+                <a:effectLst>
+                  <a:outerShdw blurRad="38100" dist="38100" dir="2700000" algn="tl">
+                    <a:srgbClr val="000000"/>
+                  </a:outerShdw>
+                </a:effectLst>
+                <a:latin typeface="+mn-lt"/>
+              </a:defRPr>
+            </a:lvl6pPr>
+            <a:lvl7pPr marL="2967038" indent="-395288" algn="l" rtl="0" eaLnBrk="1" fontAlgn="base" hangingPunct="1">
+              <a:lnSpc>
+                <a:spcPct val="90000"/>
+              </a:lnSpc>
+              <a:spcBef>
+                <a:spcPct val="30000"/>
+              </a:spcBef>
+              <a:spcAft>
+                <a:spcPct val="0"/>
+              </a:spcAft>
+              <a:buClr>
+                <a:schemeClr val="tx2"/>
+              </a:buClr>
+              <a:buSzPct val="75000"/>
+              <a:buFont typeface="Wingdings 2" pitchFamily="18" charset="2"/>
+              <a:buBlip>
+                <a:blip r:embed="rId3"/>
+              </a:buBlip>
+              <a:defRPr sz="2000">
+                <a:solidFill>
+                  <a:schemeClr val="tx1"/>
+                </a:solidFill>
+                <a:effectLst>
+                  <a:outerShdw blurRad="38100" dist="38100" dir="2700000" algn="tl">
+                    <a:srgbClr val="000000"/>
+                  </a:outerShdw>
+                </a:effectLst>
+                <a:latin typeface="+mn-lt"/>
+              </a:defRPr>
+            </a:lvl7pPr>
+            <a:lvl8pPr marL="3424238" indent="-395288" algn="l" rtl="0" eaLnBrk="1" fontAlgn="base" hangingPunct="1">
+              <a:lnSpc>
+                <a:spcPct val="90000"/>
+              </a:lnSpc>
+              <a:spcBef>
+                <a:spcPct val="30000"/>
+              </a:spcBef>
+              <a:spcAft>
+                <a:spcPct val="0"/>
+              </a:spcAft>
+              <a:buClr>
+                <a:schemeClr val="tx2"/>
+              </a:buClr>
+              <a:buSzPct val="75000"/>
+              <a:buFont typeface="Wingdings 2" pitchFamily="18" charset="2"/>
+              <a:buBlip>
+                <a:blip r:embed="rId3"/>
+              </a:buBlip>
+              <a:defRPr sz="2000">
+                <a:solidFill>
+                  <a:schemeClr val="tx1"/>
+                </a:solidFill>
+                <a:effectLst>
+                  <a:outerShdw blurRad="38100" dist="38100" dir="2700000" algn="tl">
+                    <a:srgbClr val="000000"/>
+                  </a:outerShdw>
+                </a:effectLst>
+                <a:latin typeface="+mn-lt"/>
+              </a:defRPr>
+            </a:lvl8pPr>
+            <a:lvl9pPr marL="3881438" indent="-395288" algn="l" rtl="0" eaLnBrk="1" fontAlgn="base" hangingPunct="1">
+              <a:lnSpc>
+                <a:spcPct val="90000"/>
+              </a:lnSpc>
+              <a:spcBef>
+                <a:spcPct val="30000"/>
+              </a:spcBef>
+              <a:spcAft>
+                <a:spcPct val="0"/>
+              </a:spcAft>
+              <a:buClr>
+                <a:schemeClr val="tx2"/>
+              </a:buClr>
+              <a:buSzPct val="75000"/>
+              <a:buFont typeface="Wingdings 2" pitchFamily="18" charset="2"/>
+              <a:buBlip>
+                <a:blip r:embed="rId3"/>
+              </a:buBlip>
+              <a:defRPr sz="2000">
+                <a:solidFill>
+                  <a:schemeClr val="tx1"/>
+                </a:solidFill>
+                <a:effectLst>
+                  <a:outerShdw blurRad="38100" dist="38100" dir="2700000" algn="tl">
+                    <a:srgbClr val="000000"/>
+                  </a:outerShdw>
+                </a:effectLst>
+                <a:latin typeface="+mn-lt"/>
+              </a:defRPr>
+            </a:lvl9pPr>
+          </a:lstStyle>
+          <a:p>
+            <a:r>
+              <a:rPr lang="en-US" kern="0" dirty="0" smtClean="0"/>
+              <a:t>Basic logging abstractions</a:t>
+            </a:r>
+          </a:p>
+          <a:p>
+            <a:r>
+              <a:rPr lang="en-US" kern="0" dirty="0" smtClean="0"/>
+              <a:t>Setup across all layers of the runtime/framework</a:t>
+            </a:r>
+          </a:p>
+          <a:p>
+            <a:r>
+              <a:rPr lang="en-US" kern="0" dirty="0" smtClean="0"/>
+              <a:t>Ships with </a:t>
+            </a:r>
+            <a:r>
+              <a:rPr lang="en-US" kern="0" dirty="0" err="1" smtClean="0"/>
+              <a:t>NLog</a:t>
+            </a:r>
+            <a:endParaRPr lang="en-US" kern="0" dirty="0" smtClean="0"/>
+          </a:p>
+          <a:p>
+            <a:endParaRPr lang="en-US" kern="0" dirty="0" smtClean="0"/>
           </a:p>
         </p:txBody>
       </p:sp>
     </p:spTree>
     <p:extLst>
       <p:ext uri="{BB962C8B-B14F-4D97-AF65-F5344CB8AC3E}">
-        <p14:creationId xmlns:p14="http://schemas.microsoft.com/office/powerpoint/2010/main" val="2921785292"/>
+        <p14:creationId xmlns:p14="http://schemas.microsoft.com/office/powerpoint/2010/main" val="3041910606"/>
       </p:ext>
     </p:extLst>
   </p:cSld>
@@ -14820,51 +15145,364 @@
             <p:ph type="title"/>
           </p:nvPr>
         </p:nvSpPr>
-        <p:spPr/>
-        <p:txBody>
-          <a:bodyPr/>
-          <a:lstStyle/>
-          <a:p>
-            <a:r>
-              <a:rPr lang="en-US" b="1" dirty="0" smtClean="0"/>
-              <a:t>Thanks!</a:t>
-            </a:r>
-            <a:endParaRPr lang="en-US" b="1" dirty="0"/>
-          </a:p>
-        </p:txBody>
-      </p:sp>
-      <p:sp>
-        <p:nvSpPr>
-          <p:cNvPr id="3" name="Content Placeholder 2"/>
-          <p:cNvSpPr>
-            <a:spLocks noGrp="1"/>
-          </p:cNvSpPr>
-          <p:nvPr>
-            <p:ph idx="1"/>
-          </p:nvPr>
-        </p:nvSpPr>
         <p:spPr>
           <a:xfrm>
-            <a:off x="381003" y="2370926"/>
-            <a:ext cx="8410575" cy="769441"/>
+            <a:off x="381000" y="171450"/>
+            <a:ext cx="8382000" cy="769441"/>
           </a:xfrm>
         </p:spPr>
         <p:txBody>
           <a:bodyPr/>
           <a:lstStyle/>
           <a:p>
-            <a:pPr algn="ctr">
-              <a:buNone/>
-            </a:pPr>
-            <a:r>
-              <a:rPr lang="en-US" sz="4800" b="1" dirty="0" smtClean="0"/>
-              <a:t>Questions?</a:t>
-            </a:r>
-            <a:endParaRPr lang="en-US" sz="2800" b="1" dirty="0" smtClean="0"/>
+            <a:r>
+              <a:rPr lang="en-US" b="1" dirty="0" smtClean="0"/>
+              <a:t>Hosting</a:t>
+            </a:r>
+            <a:endParaRPr lang="en-US" b="1" dirty="0"/>
+          </a:p>
+        </p:txBody>
+      </p:sp>
+      <p:sp>
+        <p:nvSpPr>
+          <p:cNvPr id="5" name="Content Placeholder 2"/>
+          <p:cNvSpPr txBox="1">
+            <a:spLocks/>
+          </p:cNvSpPr>
+          <p:nvPr/>
+        </p:nvSpPr>
+        <p:spPr bwMode="auto">
+          <a:xfrm>
+            <a:off x="381003" y="1063228"/>
+            <a:ext cx="8410575" cy="2168799"/>
+          </a:xfrm>
+          <a:prstGeom prst="rect">
+            <a:avLst/>
+          </a:prstGeom>
+          <a:noFill/>
+          <a:ln w="9525">
+            <a:noFill/>
+            <a:miter lim="800000"/>
+            <a:headEnd/>
+            <a:tailEnd/>
+          </a:ln>
+          <a:effectLst/>
+        </p:spPr>
+        <p:txBody>
+          <a:bodyPr vert="horz" wrap="square" lIns="91440" tIns="45720" rIns="91440" bIns="45720" numCol="1" anchor="t" anchorCtr="0" compatLnSpc="1">
+            <a:prstTxWarp prst="textNoShape">
+              <a:avLst/>
+            </a:prstTxWarp>
+            <a:spAutoFit/>
+          </a:bodyPr>
+          <a:lstStyle>
+            <a:lvl1pPr marL="461963" indent="-461963" algn="l" rtl="0" eaLnBrk="1" fontAlgn="base" hangingPunct="1">
+              <a:lnSpc>
+                <a:spcPct val="90000"/>
+              </a:lnSpc>
+              <a:spcBef>
+                <a:spcPct val="30000"/>
+              </a:spcBef>
+              <a:spcAft>
+                <a:spcPct val="0"/>
+              </a:spcAft>
+              <a:buClr>
+                <a:schemeClr val="tx2"/>
+              </a:buClr>
+              <a:buFont typeface="Wingdings 2" pitchFamily="18" charset="2"/>
+              <a:buBlip>
+                <a:blip r:embed="rId2"/>
+              </a:buBlip>
+              <a:defRPr sz="3200">
+                <a:solidFill>
+                  <a:schemeClr val="tx1"/>
+                </a:solidFill>
+                <a:effectLst>
+                  <a:outerShdw blurRad="38100" dist="38100" dir="2700000" algn="tl">
+                    <a:srgbClr val="000000"/>
+                  </a:outerShdw>
+                </a:effectLst>
+                <a:latin typeface="+mn-lt"/>
+                <a:ea typeface="+mn-ea"/>
+                <a:cs typeface="+mn-cs"/>
+              </a:defRPr>
+            </a:lvl1pPr>
+            <a:lvl2pPr marL="850900" indent="-387350" algn="l" rtl="0" eaLnBrk="1" fontAlgn="base" hangingPunct="1">
+              <a:lnSpc>
+                <a:spcPct val="90000"/>
+              </a:lnSpc>
+              <a:spcBef>
+                <a:spcPct val="30000"/>
+              </a:spcBef>
+              <a:spcAft>
+                <a:spcPct val="0"/>
+              </a:spcAft>
+              <a:buClr>
+                <a:schemeClr val="tx2"/>
+              </a:buClr>
+              <a:buSzPct val="75000"/>
+              <a:buFont typeface="Wingdings 2" pitchFamily="18" charset="2"/>
+              <a:buBlip>
+                <a:blip r:embed="rId3"/>
+              </a:buBlip>
+              <a:defRPr sz="2800">
+                <a:solidFill>
+                  <a:schemeClr val="tx1"/>
+                </a:solidFill>
+                <a:effectLst>
+                  <a:outerShdw blurRad="38100" dist="38100" dir="2700000" algn="tl">
+                    <a:srgbClr val="000000"/>
+                  </a:outerShdw>
+                </a:effectLst>
+                <a:latin typeface="+mn-lt"/>
+              </a:defRPr>
+            </a:lvl2pPr>
+            <a:lvl3pPr marL="1257300" indent="-404813" algn="l" rtl="0" eaLnBrk="1" fontAlgn="base" hangingPunct="1">
+              <a:lnSpc>
+                <a:spcPct val="90000"/>
+              </a:lnSpc>
+              <a:spcBef>
+                <a:spcPct val="30000"/>
+              </a:spcBef>
+              <a:spcAft>
+                <a:spcPct val="0"/>
+              </a:spcAft>
+              <a:buClr>
+                <a:schemeClr val="tx2"/>
+              </a:buClr>
+              <a:buSzPct val="75000"/>
+              <a:buFont typeface="Wingdings 2" pitchFamily="18" charset="2"/>
+              <a:buBlip>
+                <a:blip r:embed="rId3"/>
+              </a:buBlip>
+              <a:defRPr sz="2400">
+                <a:solidFill>
+                  <a:schemeClr val="tx1"/>
+                </a:solidFill>
+                <a:effectLst>
+                  <a:outerShdw blurRad="38100" dist="38100" dir="2700000" algn="tl">
+                    <a:srgbClr val="000000"/>
+                  </a:outerShdw>
+                </a:effectLst>
+                <a:latin typeface="+mn-lt"/>
+              </a:defRPr>
+            </a:lvl3pPr>
+            <a:lvl4pPr marL="1655763" indent="-396875" algn="l" rtl="0" eaLnBrk="1" fontAlgn="base" hangingPunct="1">
+              <a:lnSpc>
+                <a:spcPct val="90000"/>
+              </a:lnSpc>
+              <a:spcBef>
+                <a:spcPct val="30000"/>
+              </a:spcBef>
+              <a:spcAft>
+                <a:spcPct val="0"/>
+              </a:spcAft>
+              <a:buClr>
+                <a:schemeClr val="tx2"/>
+              </a:buClr>
+              <a:buSzPct val="75000"/>
+              <a:buFont typeface="Wingdings 2" pitchFamily="18" charset="2"/>
+              <a:buBlip>
+                <a:blip r:embed="rId3"/>
+              </a:buBlip>
+              <a:defRPr sz="2000">
+                <a:solidFill>
+                  <a:schemeClr val="tx1"/>
+                </a:solidFill>
+                <a:effectLst>
+                  <a:outerShdw blurRad="38100" dist="38100" dir="2700000" algn="tl">
+                    <a:srgbClr val="000000"/>
+                  </a:outerShdw>
+                </a:effectLst>
+                <a:latin typeface="+mn-lt"/>
+              </a:defRPr>
+            </a:lvl4pPr>
+            <a:lvl5pPr marL="2052638" indent="-395288" algn="l" rtl="0" eaLnBrk="1" fontAlgn="base" hangingPunct="1">
+              <a:lnSpc>
+                <a:spcPct val="90000"/>
+              </a:lnSpc>
+              <a:spcBef>
+                <a:spcPct val="30000"/>
+              </a:spcBef>
+              <a:spcAft>
+                <a:spcPct val="0"/>
+              </a:spcAft>
+              <a:buClr>
+                <a:schemeClr val="tx2"/>
+              </a:buClr>
+              <a:buSzPct val="75000"/>
+              <a:buFont typeface="Wingdings 2" pitchFamily="18" charset="2"/>
+              <a:buBlip>
+                <a:blip r:embed="rId3"/>
+              </a:buBlip>
+              <a:defRPr sz="2000">
+                <a:solidFill>
+                  <a:schemeClr val="tx1"/>
+                </a:solidFill>
+                <a:effectLst>
+                  <a:outerShdw blurRad="38100" dist="38100" dir="2700000" algn="tl">
+                    <a:srgbClr val="000000"/>
+                  </a:outerShdw>
+                </a:effectLst>
+                <a:latin typeface="+mn-lt"/>
+              </a:defRPr>
+            </a:lvl5pPr>
+            <a:lvl6pPr marL="2509838" indent="-395288" algn="l" rtl="0" eaLnBrk="1" fontAlgn="base" hangingPunct="1">
+              <a:lnSpc>
+                <a:spcPct val="90000"/>
+              </a:lnSpc>
+              <a:spcBef>
+                <a:spcPct val="30000"/>
+              </a:spcBef>
+              <a:spcAft>
+                <a:spcPct val="0"/>
+              </a:spcAft>
+              <a:buClr>
+                <a:schemeClr val="tx2"/>
+              </a:buClr>
+              <a:buSzPct val="75000"/>
+              <a:buFont typeface="Wingdings 2" pitchFamily="18" charset="2"/>
+              <a:buBlip>
+                <a:blip r:embed="rId3"/>
+              </a:buBlip>
+              <a:defRPr sz="2000">
+                <a:solidFill>
+                  <a:schemeClr val="tx1"/>
+                </a:solidFill>
+                <a:effectLst>
+                  <a:outerShdw blurRad="38100" dist="38100" dir="2700000" algn="tl">
+                    <a:srgbClr val="000000"/>
+                  </a:outerShdw>
+                </a:effectLst>
+                <a:latin typeface="+mn-lt"/>
+              </a:defRPr>
+            </a:lvl6pPr>
+            <a:lvl7pPr marL="2967038" indent="-395288" algn="l" rtl="0" eaLnBrk="1" fontAlgn="base" hangingPunct="1">
+              <a:lnSpc>
+                <a:spcPct val="90000"/>
+              </a:lnSpc>
+              <a:spcBef>
+                <a:spcPct val="30000"/>
+              </a:spcBef>
+              <a:spcAft>
+                <a:spcPct val="0"/>
+              </a:spcAft>
+              <a:buClr>
+                <a:schemeClr val="tx2"/>
+              </a:buClr>
+              <a:buSzPct val="75000"/>
+              <a:buFont typeface="Wingdings 2" pitchFamily="18" charset="2"/>
+              <a:buBlip>
+                <a:blip r:embed="rId3"/>
+              </a:buBlip>
+              <a:defRPr sz="2000">
+                <a:solidFill>
+                  <a:schemeClr val="tx1"/>
+                </a:solidFill>
+                <a:effectLst>
+                  <a:outerShdw blurRad="38100" dist="38100" dir="2700000" algn="tl">
+                    <a:srgbClr val="000000"/>
+                  </a:outerShdw>
+                </a:effectLst>
+                <a:latin typeface="+mn-lt"/>
+              </a:defRPr>
+            </a:lvl7pPr>
+            <a:lvl8pPr marL="3424238" indent="-395288" algn="l" rtl="0" eaLnBrk="1" fontAlgn="base" hangingPunct="1">
+              <a:lnSpc>
+                <a:spcPct val="90000"/>
+              </a:lnSpc>
+              <a:spcBef>
+                <a:spcPct val="30000"/>
+              </a:spcBef>
+              <a:spcAft>
+                <a:spcPct val="0"/>
+              </a:spcAft>
+              <a:buClr>
+                <a:schemeClr val="tx2"/>
+              </a:buClr>
+              <a:buSzPct val="75000"/>
+              <a:buFont typeface="Wingdings 2" pitchFamily="18" charset="2"/>
+              <a:buBlip>
+                <a:blip r:embed="rId3"/>
+              </a:buBlip>
+              <a:defRPr sz="2000">
+                <a:solidFill>
+                  <a:schemeClr val="tx1"/>
+                </a:solidFill>
+                <a:effectLst>
+                  <a:outerShdw blurRad="38100" dist="38100" dir="2700000" algn="tl">
+                    <a:srgbClr val="000000"/>
+                  </a:outerShdw>
+                </a:effectLst>
+                <a:latin typeface="+mn-lt"/>
+              </a:defRPr>
+            </a:lvl8pPr>
+            <a:lvl9pPr marL="3881438" indent="-395288" algn="l" rtl="0" eaLnBrk="1" fontAlgn="base" hangingPunct="1">
+              <a:lnSpc>
+                <a:spcPct val="90000"/>
+              </a:lnSpc>
+              <a:spcBef>
+                <a:spcPct val="30000"/>
+              </a:spcBef>
+              <a:spcAft>
+                <a:spcPct val="0"/>
+              </a:spcAft>
+              <a:buClr>
+                <a:schemeClr val="tx2"/>
+              </a:buClr>
+              <a:buSzPct val="75000"/>
+              <a:buFont typeface="Wingdings 2" pitchFamily="18" charset="2"/>
+              <a:buBlip>
+                <a:blip r:embed="rId3"/>
+              </a:buBlip>
+              <a:defRPr sz="2000">
+                <a:solidFill>
+                  <a:schemeClr val="tx1"/>
+                </a:solidFill>
+                <a:effectLst>
+                  <a:outerShdw blurRad="38100" dist="38100" dir="2700000" algn="tl">
+                    <a:srgbClr val="000000"/>
+                  </a:outerShdw>
+                </a:effectLst>
+                <a:latin typeface="+mn-lt"/>
+              </a:defRPr>
+            </a:lvl9pPr>
+          </a:lstStyle>
+          <a:p>
+            <a:r>
+              <a:rPr lang="en-US" b="1" i="1" kern="0" dirty="0" smtClean="0"/>
+              <a:t>Server</a:t>
+            </a:r>
+            <a:r>
+              <a:rPr lang="en-US" kern="0" dirty="0" smtClean="0"/>
+              <a:t> becomes a pluggable component</a:t>
+            </a:r>
+          </a:p>
+          <a:p>
+            <a:r>
+              <a:rPr lang="en-US" kern="0" dirty="0" smtClean="0"/>
+              <a:t>Allows for self-hosting and </a:t>
+            </a:r>
+            <a:r>
+              <a:rPr lang="en-US" b="1" i="1" kern="0" dirty="0" smtClean="0"/>
+              <a:t>standard</a:t>
+            </a:r>
+            <a:r>
+              <a:rPr lang="en-US" kern="0" dirty="0" smtClean="0"/>
+              <a:t> scenarios</a:t>
+            </a:r>
+          </a:p>
+          <a:p>
+            <a:endParaRPr lang="en-US" kern="0" dirty="0" smtClean="0"/>
           </a:p>
         </p:txBody>
       </p:sp>
     </p:spTree>
+    <p:extLst>
+      <p:ext uri="{BB962C8B-B14F-4D97-AF65-F5344CB8AC3E}">
+        <p14:creationId xmlns:p14="http://schemas.microsoft.com/office/powerpoint/2010/main" val="2992702651"/>
+      </p:ext>
+    </p:extLst>
   </p:cSld>
   <p:clrMapOvr>
     <a:masterClrMapping/>
@@ -14952,11 +15590,7 @@
             </a:pPr>
             <a:r>
               <a:rPr lang="en-US" b="1" i="1" dirty="0" smtClean="0"/>
-              <a:t>This is a slide heavy presentation</a:t>
-            </a:r>
-            <a:r>
-              <a:rPr lang="en-US" b="1" i="1" dirty="0" smtClean="0"/>
-              <a:t>. My apologies for this but it was the only way to get the information needed to understand the demos/new way of doing things.</a:t>
+              <a:t>This is a slide heavy presentation. My apologies for this but it was the only way to get the information needed to understand the demos/new way of doing things.</a:t>
             </a:r>
             <a:endParaRPr lang="en-US" b="1" i="1" dirty="0"/>
           </a:p>
@@ -14968,6 +15602,1039 @@
         <p14:creationId xmlns:p14="http://schemas.microsoft.com/office/powerpoint/2010/main" val="624275816"/>
       </p:ext>
     </p:extLst>
+  </p:cSld>
+  <p:clrMapOvr>
+    <a:masterClrMapping/>
+  </p:clrMapOvr>
+  <p:transition xmlns:p14="http://schemas.microsoft.com/office/powerpoint/2010/main">
+    <p:fade/>
+  </p:transition>
+  <p:timing>
+    <p:tnLst>
+      <p:par>
+        <p:cTn xmlns:p14="http://schemas.microsoft.com/office/powerpoint/2010/main" id="1" dur="indefinite" restart="never" nodeType="tmRoot"/>
+      </p:par>
+    </p:tnLst>
+  </p:timing>
+</p:sld>
+</file>
+
+<file path=ppt/slides/slide30.xml><?xml version="1.0" encoding="utf-8"?>
+<p:sld xmlns:a="http://schemas.openxmlformats.org/drawingml/2006/main" xmlns:r="http://schemas.openxmlformats.org/officeDocument/2006/relationships" xmlns:p="http://schemas.openxmlformats.org/presentationml/2006/main">
+  <p:cSld>
+    <p:spTree>
+      <p:nvGrpSpPr>
+        <p:cNvPr id="1" name=""/>
+        <p:cNvGrpSpPr/>
+        <p:nvPr/>
+      </p:nvGrpSpPr>
+      <p:grpSpPr>
+        <a:xfrm>
+          <a:off x="0" y="0"/>
+          <a:ext cx="0" cy="0"/>
+          <a:chOff x="0" y="0"/>
+          <a:chExt cx="0" cy="0"/>
+        </a:xfrm>
+      </p:grpSpPr>
+      <p:sp>
+        <p:nvSpPr>
+          <p:cNvPr id="2" name="Title 1"/>
+          <p:cNvSpPr>
+            <a:spLocks noGrp="1"/>
+          </p:cNvSpPr>
+          <p:nvPr>
+            <p:ph type="title"/>
+          </p:nvPr>
+        </p:nvSpPr>
+        <p:spPr>
+          <a:xfrm>
+            <a:off x="381000" y="171450"/>
+            <a:ext cx="8382000" cy="769441"/>
+          </a:xfrm>
+        </p:spPr>
+        <p:txBody>
+          <a:bodyPr/>
+          <a:lstStyle/>
+          <a:p>
+            <a:r>
+              <a:rPr lang="en-US" b="1" dirty="0" smtClean="0"/>
+              <a:t>Hosting</a:t>
+            </a:r>
+            <a:endParaRPr lang="en-US" b="1" dirty="0"/>
+          </a:p>
+        </p:txBody>
+      </p:sp>
+      <p:sp>
+        <p:nvSpPr>
+          <p:cNvPr id="5" name="Content Placeholder 2"/>
+          <p:cNvSpPr txBox="1">
+            <a:spLocks/>
+          </p:cNvSpPr>
+          <p:nvPr/>
+        </p:nvSpPr>
+        <p:spPr bwMode="auto">
+          <a:xfrm>
+            <a:off x="381003" y="1063228"/>
+            <a:ext cx="8410575" cy="3645100"/>
+          </a:xfrm>
+          <a:prstGeom prst="rect">
+            <a:avLst/>
+          </a:prstGeom>
+          <a:noFill/>
+          <a:ln w="9525">
+            <a:noFill/>
+            <a:miter lim="800000"/>
+            <a:headEnd/>
+            <a:tailEnd/>
+          </a:ln>
+          <a:effectLst/>
+        </p:spPr>
+        <p:txBody>
+          <a:bodyPr vert="horz" wrap="square" lIns="91440" tIns="45720" rIns="91440" bIns="45720" numCol="1" anchor="t" anchorCtr="0" compatLnSpc="1">
+            <a:prstTxWarp prst="textNoShape">
+              <a:avLst/>
+            </a:prstTxWarp>
+            <a:spAutoFit/>
+          </a:bodyPr>
+          <a:lstStyle>
+            <a:lvl1pPr marL="461963" indent="-461963" algn="l" rtl="0" eaLnBrk="1" fontAlgn="base" hangingPunct="1">
+              <a:lnSpc>
+                <a:spcPct val="90000"/>
+              </a:lnSpc>
+              <a:spcBef>
+                <a:spcPct val="30000"/>
+              </a:spcBef>
+              <a:spcAft>
+                <a:spcPct val="0"/>
+              </a:spcAft>
+              <a:buClr>
+                <a:schemeClr val="tx2"/>
+              </a:buClr>
+              <a:buFont typeface="Wingdings 2" pitchFamily="18" charset="2"/>
+              <a:buBlip>
+                <a:blip r:embed="rId2"/>
+              </a:buBlip>
+              <a:defRPr sz="3200">
+                <a:solidFill>
+                  <a:schemeClr val="tx1"/>
+                </a:solidFill>
+                <a:effectLst>
+                  <a:outerShdw blurRad="38100" dist="38100" dir="2700000" algn="tl">
+                    <a:srgbClr val="000000"/>
+                  </a:outerShdw>
+                </a:effectLst>
+                <a:latin typeface="+mn-lt"/>
+                <a:ea typeface="+mn-ea"/>
+                <a:cs typeface="+mn-cs"/>
+              </a:defRPr>
+            </a:lvl1pPr>
+            <a:lvl2pPr marL="850900" indent="-387350" algn="l" rtl="0" eaLnBrk="1" fontAlgn="base" hangingPunct="1">
+              <a:lnSpc>
+                <a:spcPct val="90000"/>
+              </a:lnSpc>
+              <a:spcBef>
+                <a:spcPct val="30000"/>
+              </a:spcBef>
+              <a:spcAft>
+                <a:spcPct val="0"/>
+              </a:spcAft>
+              <a:buClr>
+                <a:schemeClr val="tx2"/>
+              </a:buClr>
+              <a:buSzPct val="75000"/>
+              <a:buFont typeface="Wingdings 2" pitchFamily="18" charset="2"/>
+              <a:buBlip>
+                <a:blip r:embed="rId3"/>
+              </a:buBlip>
+              <a:defRPr sz="2800">
+                <a:solidFill>
+                  <a:schemeClr val="tx1"/>
+                </a:solidFill>
+                <a:effectLst>
+                  <a:outerShdw blurRad="38100" dist="38100" dir="2700000" algn="tl">
+                    <a:srgbClr val="000000"/>
+                  </a:outerShdw>
+                </a:effectLst>
+                <a:latin typeface="+mn-lt"/>
+              </a:defRPr>
+            </a:lvl2pPr>
+            <a:lvl3pPr marL="1257300" indent="-404813" algn="l" rtl="0" eaLnBrk="1" fontAlgn="base" hangingPunct="1">
+              <a:lnSpc>
+                <a:spcPct val="90000"/>
+              </a:lnSpc>
+              <a:spcBef>
+                <a:spcPct val="30000"/>
+              </a:spcBef>
+              <a:spcAft>
+                <a:spcPct val="0"/>
+              </a:spcAft>
+              <a:buClr>
+                <a:schemeClr val="tx2"/>
+              </a:buClr>
+              <a:buSzPct val="75000"/>
+              <a:buFont typeface="Wingdings 2" pitchFamily="18" charset="2"/>
+              <a:buBlip>
+                <a:blip r:embed="rId3"/>
+              </a:buBlip>
+              <a:defRPr sz="2400">
+                <a:solidFill>
+                  <a:schemeClr val="tx1"/>
+                </a:solidFill>
+                <a:effectLst>
+                  <a:outerShdw blurRad="38100" dist="38100" dir="2700000" algn="tl">
+                    <a:srgbClr val="000000"/>
+                  </a:outerShdw>
+                </a:effectLst>
+                <a:latin typeface="+mn-lt"/>
+              </a:defRPr>
+            </a:lvl3pPr>
+            <a:lvl4pPr marL="1655763" indent="-396875" algn="l" rtl="0" eaLnBrk="1" fontAlgn="base" hangingPunct="1">
+              <a:lnSpc>
+                <a:spcPct val="90000"/>
+              </a:lnSpc>
+              <a:spcBef>
+                <a:spcPct val="30000"/>
+              </a:spcBef>
+              <a:spcAft>
+                <a:spcPct val="0"/>
+              </a:spcAft>
+              <a:buClr>
+                <a:schemeClr val="tx2"/>
+              </a:buClr>
+              <a:buSzPct val="75000"/>
+              <a:buFont typeface="Wingdings 2" pitchFamily="18" charset="2"/>
+              <a:buBlip>
+                <a:blip r:embed="rId3"/>
+              </a:buBlip>
+              <a:defRPr sz="2000">
+                <a:solidFill>
+                  <a:schemeClr val="tx1"/>
+                </a:solidFill>
+                <a:effectLst>
+                  <a:outerShdw blurRad="38100" dist="38100" dir="2700000" algn="tl">
+                    <a:srgbClr val="000000"/>
+                  </a:outerShdw>
+                </a:effectLst>
+                <a:latin typeface="+mn-lt"/>
+              </a:defRPr>
+            </a:lvl4pPr>
+            <a:lvl5pPr marL="2052638" indent="-395288" algn="l" rtl="0" eaLnBrk="1" fontAlgn="base" hangingPunct="1">
+              <a:lnSpc>
+                <a:spcPct val="90000"/>
+              </a:lnSpc>
+              <a:spcBef>
+                <a:spcPct val="30000"/>
+              </a:spcBef>
+              <a:spcAft>
+                <a:spcPct val="0"/>
+              </a:spcAft>
+              <a:buClr>
+                <a:schemeClr val="tx2"/>
+              </a:buClr>
+              <a:buSzPct val="75000"/>
+              <a:buFont typeface="Wingdings 2" pitchFamily="18" charset="2"/>
+              <a:buBlip>
+                <a:blip r:embed="rId3"/>
+              </a:buBlip>
+              <a:defRPr sz="2000">
+                <a:solidFill>
+                  <a:schemeClr val="tx1"/>
+                </a:solidFill>
+                <a:effectLst>
+                  <a:outerShdw blurRad="38100" dist="38100" dir="2700000" algn="tl">
+                    <a:srgbClr val="000000"/>
+                  </a:outerShdw>
+                </a:effectLst>
+                <a:latin typeface="+mn-lt"/>
+              </a:defRPr>
+            </a:lvl5pPr>
+            <a:lvl6pPr marL="2509838" indent="-395288" algn="l" rtl="0" eaLnBrk="1" fontAlgn="base" hangingPunct="1">
+              <a:lnSpc>
+                <a:spcPct val="90000"/>
+              </a:lnSpc>
+              <a:spcBef>
+                <a:spcPct val="30000"/>
+              </a:spcBef>
+              <a:spcAft>
+                <a:spcPct val="0"/>
+              </a:spcAft>
+              <a:buClr>
+                <a:schemeClr val="tx2"/>
+              </a:buClr>
+              <a:buSzPct val="75000"/>
+              <a:buFont typeface="Wingdings 2" pitchFamily="18" charset="2"/>
+              <a:buBlip>
+                <a:blip r:embed="rId3"/>
+              </a:buBlip>
+              <a:defRPr sz="2000">
+                <a:solidFill>
+                  <a:schemeClr val="tx1"/>
+                </a:solidFill>
+                <a:effectLst>
+                  <a:outerShdw blurRad="38100" dist="38100" dir="2700000" algn="tl">
+                    <a:srgbClr val="000000"/>
+                  </a:outerShdw>
+                </a:effectLst>
+                <a:latin typeface="+mn-lt"/>
+              </a:defRPr>
+            </a:lvl6pPr>
+            <a:lvl7pPr marL="2967038" indent="-395288" algn="l" rtl="0" eaLnBrk="1" fontAlgn="base" hangingPunct="1">
+              <a:lnSpc>
+                <a:spcPct val="90000"/>
+              </a:lnSpc>
+              <a:spcBef>
+                <a:spcPct val="30000"/>
+              </a:spcBef>
+              <a:spcAft>
+                <a:spcPct val="0"/>
+              </a:spcAft>
+              <a:buClr>
+                <a:schemeClr val="tx2"/>
+              </a:buClr>
+              <a:buSzPct val="75000"/>
+              <a:buFont typeface="Wingdings 2" pitchFamily="18" charset="2"/>
+              <a:buBlip>
+                <a:blip r:embed="rId3"/>
+              </a:buBlip>
+              <a:defRPr sz="2000">
+                <a:solidFill>
+                  <a:schemeClr val="tx1"/>
+                </a:solidFill>
+                <a:effectLst>
+                  <a:outerShdw blurRad="38100" dist="38100" dir="2700000" algn="tl">
+                    <a:srgbClr val="000000"/>
+                  </a:outerShdw>
+                </a:effectLst>
+                <a:latin typeface="+mn-lt"/>
+              </a:defRPr>
+            </a:lvl7pPr>
+            <a:lvl8pPr marL="3424238" indent="-395288" algn="l" rtl="0" eaLnBrk="1" fontAlgn="base" hangingPunct="1">
+              <a:lnSpc>
+                <a:spcPct val="90000"/>
+              </a:lnSpc>
+              <a:spcBef>
+                <a:spcPct val="30000"/>
+              </a:spcBef>
+              <a:spcAft>
+                <a:spcPct val="0"/>
+              </a:spcAft>
+              <a:buClr>
+                <a:schemeClr val="tx2"/>
+              </a:buClr>
+              <a:buSzPct val="75000"/>
+              <a:buFont typeface="Wingdings 2" pitchFamily="18" charset="2"/>
+              <a:buBlip>
+                <a:blip r:embed="rId3"/>
+              </a:buBlip>
+              <a:defRPr sz="2000">
+                <a:solidFill>
+                  <a:schemeClr val="tx1"/>
+                </a:solidFill>
+                <a:effectLst>
+                  <a:outerShdw blurRad="38100" dist="38100" dir="2700000" algn="tl">
+                    <a:srgbClr val="000000"/>
+                  </a:outerShdw>
+                </a:effectLst>
+                <a:latin typeface="+mn-lt"/>
+              </a:defRPr>
+            </a:lvl8pPr>
+            <a:lvl9pPr marL="3881438" indent="-395288" algn="l" rtl="0" eaLnBrk="1" fontAlgn="base" hangingPunct="1">
+              <a:lnSpc>
+                <a:spcPct val="90000"/>
+              </a:lnSpc>
+              <a:spcBef>
+                <a:spcPct val="30000"/>
+              </a:spcBef>
+              <a:spcAft>
+                <a:spcPct val="0"/>
+              </a:spcAft>
+              <a:buClr>
+                <a:schemeClr val="tx2"/>
+              </a:buClr>
+              <a:buSzPct val="75000"/>
+              <a:buFont typeface="Wingdings 2" pitchFamily="18" charset="2"/>
+              <a:buBlip>
+                <a:blip r:embed="rId3"/>
+              </a:buBlip>
+              <a:defRPr sz="2000">
+                <a:solidFill>
+                  <a:schemeClr val="tx1"/>
+                </a:solidFill>
+                <a:effectLst>
+                  <a:outerShdw blurRad="38100" dist="38100" dir="2700000" algn="tl">
+                    <a:srgbClr val="000000"/>
+                  </a:outerShdw>
+                </a:effectLst>
+                <a:latin typeface="+mn-lt"/>
+              </a:defRPr>
+            </a:lvl9pPr>
+          </a:lstStyle>
+          <a:p>
+            <a:r>
+              <a:rPr lang="en-US" b="1" kern="0" dirty="0" err="1"/>
+              <a:t>Microsoft.AspNet.Loader.IIS</a:t>
+            </a:r>
+            <a:r>
+              <a:rPr lang="en-US" b="1" kern="0" dirty="0"/>
+              <a:t> (Helios</a:t>
+            </a:r>
+            <a:r>
+              <a:rPr lang="en-US" b="1" kern="0" dirty="0" smtClean="0"/>
+              <a:t>)</a:t>
+            </a:r>
+          </a:p>
+          <a:p>
+            <a:pPr lvl="1"/>
+            <a:r>
+              <a:rPr lang="en-US" kern="0" dirty="0" smtClean="0"/>
+              <a:t>Integration with IIS and IIS Components</a:t>
+            </a:r>
+          </a:p>
+          <a:p>
+            <a:pPr lvl="1"/>
+            <a:r>
+              <a:rPr lang="en-US" kern="0" dirty="0" smtClean="0"/>
+              <a:t>Bypasses </a:t>
+            </a:r>
+            <a:r>
+              <a:rPr lang="en-US" kern="0" dirty="0" err="1" smtClean="0"/>
+              <a:t>System.Web</a:t>
+            </a:r>
+            <a:r>
+              <a:rPr lang="en-US" kern="0" dirty="0" smtClean="0"/>
+              <a:t> (good thing)</a:t>
+            </a:r>
+            <a:endParaRPr lang="en-US" kern="0" dirty="0"/>
+          </a:p>
+          <a:p>
+            <a:r>
+              <a:rPr lang="en-US" b="1" dirty="0" err="1"/>
+              <a:t>Microsoft.AspNet.Server.WebListener</a:t>
+            </a:r>
+            <a:r>
+              <a:rPr lang="en-US" b="1" dirty="0"/>
+              <a:t> (</a:t>
+            </a:r>
+            <a:r>
+              <a:rPr lang="en-US" b="1" dirty="0" err="1"/>
+              <a:t>WebListener</a:t>
+            </a:r>
+            <a:r>
+              <a:rPr lang="en-US" b="1" dirty="0" smtClean="0"/>
+              <a:t>)</a:t>
+            </a:r>
+          </a:p>
+          <a:p>
+            <a:pPr lvl="1"/>
+            <a:r>
+              <a:rPr lang="en-US" kern="0" dirty="0" smtClean="0"/>
+              <a:t>Uses </a:t>
+            </a:r>
+            <a:r>
+              <a:rPr lang="en-US" kern="0" dirty="0" err="1" smtClean="0"/>
+              <a:t>Http.sys</a:t>
+            </a:r>
+            <a:r>
+              <a:rPr lang="en-US" kern="0" dirty="0" smtClean="0"/>
+              <a:t> kernel driver</a:t>
+            </a:r>
+          </a:p>
+          <a:p>
+            <a:pPr lvl="1"/>
+            <a:r>
+              <a:rPr lang="en-US" kern="0" dirty="0" smtClean="0"/>
+              <a:t>Non-IIS hosting (Windows only)</a:t>
+            </a:r>
+          </a:p>
+        </p:txBody>
+      </p:sp>
+    </p:spTree>
+    <p:extLst>
+      <p:ext uri="{BB962C8B-B14F-4D97-AF65-F5344CB8AC3E}">
+        <p14:creationId xmlns:p14="http://schemas.microsoft.com/office/powerpoint/2010/main" val="1523432280"/>
+      </p:ext>
+    </p:extLst>
+  </p:cSld>
+  <p:clrMapOvr>
+    <a:masterClrMapping/>
+  </p:clrMapOvr>
+  <p:transition xmlns:p14="http://schemas.microsoft.com/office/powerpoint/2010/main">
+    <p:fade/>
+  </p:transition>
+  <p:timing>
+    <p:tnLst>
+      <p:par>
+        <p:cTn xmlns:p14="http://schemas.microsoft.com/office/powerpoint/2010/main" id="1" dur="indefinite" restart="never" nodeType="tmRoot"/>
+      </p:par>
+    </p:tnLst>
+  </p:timing>
+</p:sld>
+</file>
+
+<file path=ppt/slides/slide31.xml><?xml version="1.0" encoding="utf-8"?>
+<p:sld xmlns:a="http://schemas.openxmlformats.org/drawingml/2006/main" xmlns:r="http://schemas.openxmlformats.org/officeDocument/2006/relationships" xmlns:p="http://schemas.openxmlformats.org/presentationml/2006/main">
+  <p:cSld>
+    <p:spTree>
+      <p:nvGrpSpPr>
+        <p:cNvPr id="1" name=""/>
+        <p:cNvGrpSpPr/>
+        <p:nvPr/>
+      </p:nvGrpSpPr>
+      <p:grpSpPr>
+        <a:xfrm>
+          <a:off x="0" y="0"/>
+          <a:ext cx="0" cy="0"/>
+          <a:chOff x="0" y="0"/>
+          <a:chExt cx="0" cy="0"/>
+        </a:xfrm>
+      </p:grpSpPr>
+      <p:sp>
+        <p:nvSpPr>
+          <p:cNvPr id="2" name="Title 1"/>
+          <p:cNvSpPr>
+            <a:spLocks noGrp="1"/>
+          </p:cNvSpPr>
+          <p:nvPr>
+            <p:ph type="title"/>
+          </p:nvPr>
+        </p:nvSpPr>
+        <p:spPr>
+          <a:xfrm>
+            <a:off x="381000" y="171450"/>
+            <a:ext cx="8382000" cy="769441"/>
+          </a:xfrm>
+        </p:spPr>
+        <p:txBody>
+          <a:bodyPr/>
+          <a:lstStyle/>
+          <a:p>
+            <a:r>
+              <a:rPr lang="en-US" b="1" dirty="0" smtClean="0"/>
+              <a:t>Hosting</a:t>
+            </a:r>
+            <a:endParaRPr lang="en-US" b="1" dirty="0"/>
+          </a:p>
+        </p:txBody>
+      </p:sp>
+      <p:sp>
+        <p:nvSpPr>
+          <p:cNvPr id="5" name="Content Placeholder 2"/>
+          <p:cNvSpPr txBox="1">
+            <a:spLocks/>
+          </p:cNvSpPr>
+          <p:nvPr/>
+        </p:nvSpPr>
+        <p:spPr bwMode="auto">
+          <a:xfrm>
+            <a:off x="381003" y="1063228"/>
+            <a:ext cx="8410575" cy="1059777"/>
+          </a:xfrm>
+          <a:prstGeom prst="rect">
+            <a:avLst/>
+          </a:prstGeom>
+          <a:noFill/>
+          <a:ln w="9525">
+            <a:noFill/>
+            <a:miter lim="800000"/>
+            <a:headEnd/>
+            <a:tailEnd/>
+          </a:ln>
+          <a:effectLst/>
+        </p:spPr>
+        <p:txBody>
+          <a:bodyPr vert="horz" wrap="square" lIns="91440" tIns="45720" rIns="91440" bIns="45720" numCol="1" anchor="t" anchorCtr="0" compatLnSpc="1">
+            <a:prstTxWarp prst="textNoShape">
+              <a:avLst/>
+            </a:prstTxWarp>
+            <a:spAutoFit/>
+          </a:bodyPr>
+          <a:lstStyle>
+            <a:lvl1pPr marL="461963" indent="-461963" algn="l" rtl="0" eaLnBrk="1" fontAlgn="base" hangingPunct="1">
+              <a:lnSpc>
+                <a:spcPct val="90000"/>
+              </a:lnSpc>
+              <a:spcBef>
+                <a:spcPct val="30000"/>
+              </a:spcBef>
+              <a:spcAft>
+                <a:spcPct val="0"/>
+              </a:spcAft>
+              <a:buClr>
+                <a:schemeClr val="tx2"/>
+              </a:buClr>
+              <a:buFont typeface="Wingdings 2" pitchFamily="18" charset="2"/>
+              <a:buBlip>
+                <a:blip r:embed="rId2"/>
+              </a:buBlip>
+              <a:defRPr sz="3200">
+                <a:solidFill>
+                  <a:schemeClr val="tx1"/>
+                </a:solidFill>
+                <a:effectLst>
+                  <a:outerShdw blurRad="38100" dist="38100" dir="2700000" algn="tl">
+                    <a:srgbClr val="000000"/>
+                  </a:outerShdw>
+                </a:effectLst>
+                <a:latin typeface="+mn-lt"/>
+                <a:ea typeface="+mn-ea"/>
+                <a:cs typeface="+mn-cs"/>
+              </a:defRPr>
+            </a:lvl1pPr>
+            <a:lvl2pPr marL="850900" indent="-387350" algn="l" rtl="0" eaLnBrk="1" fontAlgn="base" hangingPunct="1">
+              <a:lnSpc>
+                <a:spcPct val="90000"/>
+              </a:lnSpc>
+              <a:spcBef>
+                <a:spcPct val="30000"/>
+              </a:spcBef>
+              <a:spcAft>
+                <a:spcPct val="0"/>
+              </a:spcAft>
+              <a:buClr>
+                <a:schemeClr val="tx2"/>
+              </a:buClr>
+              <a:buSzPct val="75000"/>
+              <a:buFont typeface="Wingdings 2" pitchFamily="18" charset="2"/>
+              <a:buBlip>
+                <a:blip r:embed="rId3"/>
+              </a:buBlip>
+              <a:defRPr sz="2800">
+                <a:solidFill>
+                  <a:schemeClr val="tx1"/>
+                </a:solidFill>
+                <a:effectLst>
+                  <a:outerShdw blurRad="38100" dist="38100" dir="2700000" algn="tl">
+                    <a:srgbClr val="000000"/>
+                  </a:outerShdw>
+                </a:effectLst>
+                <a:latin typeface="+mn-lt"/>
+              </a:defRPr>
+            </a:lvl2pPr>
+            <a:lvl3pPr marL="1257300" indent="-404813" algn="l" rtl="0" eaLnBrk="1" fontAlgn="base" hangingPunct="1">
+              <a:lnSpc>
+                <a:spcPct val="90000"/>
+              </a:lnSpc>
+              <a:spcBef>
+                <a:spcPct val="30000"/>
+              </a:spcBef>
+              <a:spcAft>
+                <a:spcPct val="0"/>
+              </a:spcAft>
+              <a:buClr>
+                <a:schemeClr val="tx2"/>
+              </a:buClr>
+              <a:buSzPct val="75000"/>
+              <a:buFont typeface="Wingdings 2" pitchFamily="18" charset="2"/>
+              <a:buBlip>
+                <a:blip r:embed="rId3"/>
+              </a:buBlip>
+              <a:defRPr sz="2400">
+                <a:solidFill>
+                  <a:schemeClr val="tx1"/>
+                </a:solidFill>
+                <a:effectLst>
+                  <a:outerShdw blurRad="38100" dist="38100" dir="2700000" algn="tl">
+                    <a:srgbClr val="000000"/>
+                  </a:outerShdw>
+                </a:effectLst>
+                <a:latin typeface="+mn-lt"/>
+              </a:defRPr>
+            </a:lvl3pPr>
+            <a:lvl4pPr marL="1655763" indent="-396875" algn="l" rtl="0" eaLnBrk="1" fontAlgn="base" hangingPunct="1">
+              <a:lnSpc>
+                <a:spcPct val="90000"/>
+              </a:lnSpc>
+              <a:spcBef>
+                <a:spcPct val="30000"/>
+              </a:spcBef>
+              <a:spcAft>
+                <a:spcPct val="0"/>
+              </a:spcAft>
+              <a:buClr>
+                <a:schemeClr val="tx2"/>
+              </a:buClr>
+              <a:buSzPct val="75000"/>
+              <a:buFont typeface="Wingdings 2" pitchFamily="18" charset="2"/>
+              <a:buBlip>
+                <a:blip r:embed="rId3"/>
+              </a:buBlip>
+              <a:defRPr sz="2000">
+                <a:solidFill>
+                  <a:schemeClr val="tx1"/>
+                </a:solidFill>
+                <a:effectLst>
+                  <a:outerShdw blurRad="38100" dist="38100" dir="2700000" algn="tl">
+                    <a:srgbClr val="000000"/>
+                  </a:outerShdw>
+                </a:effectLst>
+                <a:latin typeface="+mn-lt"/>
+              </a:defRPr>
+            </a:lvl4pPr>
+            <a:lvl5pPr marL="2052638" indent="-395288" algn="l" rtl="0" eaLnBrk="1" fontAlgn="base" hangingPunct="1">
+              <a:lnSpc>
+                <a:spcPct val="90000"/>
+              </a:lnSpc>
+              <a:spcBef>
+                <a:spcPct val="30000"/>
+              </a:spcBef>
+              <a:spcAft>
+                <a:spcPct val="0"/>
+              </a:spcAft>
+              <a:buClr>
+                <a:schemeClr val="tx2"/>
+              </a:buClr>
+              <a:buSzPct val="75000"/>
+              <a:buFont typeface="Wingdings 2" pitchFamily="18" charset="2"/>
+              <a:buBlip>
+                <a:blip r:embed="rId3"/>
+              </a:buBlip>
+              <a:defRPr sz="2000">
+                <a:solidFill>
+                  <a:schemeClr val="tx1"/>
+                </a:solidFill>
+                <a:effectLst>
+                  <a:outerShdw blurRad="38100" dist="38100" dir="2700000" algn="tl">
+                    <a:srgbClr val="000000"/>
+                  </a:outerShdw>
+                </a:effectLst>
+                <a:latin typeface="+mn-lt"/>
+              </a:defRPr>
+            </a:lvl5pPr>
+            <a:lvl6pPr marL="2509838" indent="-395288" algn="l" rtl="0" eaLnBrk="1" fontAlgn="base" hangingPunct="1">
+              <a:lnSpc>
+                <a:spcPct val="90000"/>
+              </a:lnSpc>
+              <a:spcBef>
+                <a:spcPct val="30000"/>
+              </a:spcBef>
+              <a:spcAft>
+                <a:spcPct val="0"/>
+              </a:spcAft>
+              <a:buClr>
+                <a:schemeClr val="tx2"/>
+              </a:buClr>
+              <a:buSzPct val="75000"/>
+              <a:buFont typeface="Wingdings 2" pitchFamily="18" charset="2"/>
+              <a:buBlip>
+                <a:blip r:embed="rId3"/>
+              </a:buBlip>
+              <a:defRPr sz="2000">
+                <a:solidFill>
+                  <a:schemeClr val="tx1"/>
+                </a:solidFill>
+                <a:effectLst>
+                  <a:outerShdw blurRad="38100" dist="38100" dir="2700000" algn="tl">
+                    <a:srgbClr val="000000"/>
+                  </a:outerShdw>
+                </a:effectLst>
+                <a:latin typeface="+mn-lt"/>
+              </a:defRPr>
+            </a:lvl6pPr>
+            <a:lvl7pPr marL="2967038" indent="-395288" algn="l" rtl="0" eaLnBrk="1" fontAlgn="base" hangingPunct="1">
+              <a:lnSpc>
+                <a:spcPct val="90000"/>
+              </a:lnSpc>
+              <a:spcBef>
+                <a:spcPct val="30000"/>
+              </a:spcBef>
+              <a:spcAft>
+                <a:spcPct val="0"/>
+              </a:spcAft>
+              <a:buClr>
+                <a:schemeClr val="tx2"/>
+              </a:buClr>
+              <a:buSzPct val="75000"/>
+              <a:buFont typeface="Wingdings 2" pitchFamily="18" charset="2"/>
+              <a:buBlip>
+                <a:blip r:embed="rId3"/>
+              </a:buBlip>
+              <a:defRPr sz="2000">
+                <a:solidFill>
+                  <a:schemeClr val="tx1"/>
+                </a:solidFill>
+                <a:effectLst>
+                  <a:outerShdw blurRad="38100" dist="38100" dir="2700000" algn="tl">
+                    <a:srgbClr val="000000"/>
+                  </a:outerShdw>
+                </a:effectLst>
+                <a:latin typeface="+mn-lt"/>
+              </a:defRPr>
+            </a:lvl7pPr>
+            <a:lvl8pPr marL="3424238" indent="-395288" algn="l" rtl="0" eaLnBrk="1" fontAlgn="base" hangingPunct="1">
+              <a:lnSpc>
+                <a:spcPct val="90000"/>
+              </a:lnSpc>
+              <a:spcBef>
+                <a:spcPct val="30000"/>
+              </a:spcBef>
+              <a:spcAft>
+                <a:spcPct val="0"/>
+              </a:spcAft>
+              <a:buClr>
+                <a:schemeClr val="tx2"/>
+              </a:buClr>
+              <a:buSzPct val="75000"/>
+              <a:buFont typeface="Wingdings 2" pitchFamily="18" charset="2"/>
+              <a:buBlip>
+                <a:blip r:embed="rId3"/>
+              </a:buBlip>
+              <a:defRPr sz="2000">
+                <a:solidFill>
+                  <a:schemeClr val="tx1"/>
+                </a:solidFill>
+                <a:effectLst>
+                  <a:outerShdw blurRad="38100" dist="38100" dir="2700000" algn="tl">
+                    <a:srgbClr val="000000"/>
+                  </a:outerShdw>
+                </a:effectLst>
+                <a:latin typeface="+mn-lt"/>
+              </a:defRPr>
+            </a:lvl8pPr>
+            <a:lvl9pPr marL="3881438" indent="-395288" algn="l" rtl="0" eaLnBrk="1" fontAlgn="base" hangingPunct="1">
+              <a:lnSpc>
+                <a:spcPct val="90000"/>
+              </a:lnSpc>
+              <a:spcBef>
+                <a:spcPct val="30000"/>
+              </a:spcBef>
+              <a:spcAft>
+                <a:spcPct val="0"/>
+              </a:spcAft>
+              <a:buClr>
+                <a:schemeClr val="tx2"/>
+              </a:buClr>
+              <a:buSzPct val="75000"/>
+              <a:buFont typeface="Wingdings 2" pitchFamily="18" charset="2"/>
+              <a:buBlip>
+                <a:blip r:embed="rId3"/>
+              </a:buBlip>
+              <a:defRPr sz="2000">
+                <a:solidFill>
+                  <a:schemeClr val="tx1"/>
+                </a:solidFill>
+                <a:effectLst>
+                  <a:outerShdw blurRad="38100" dist="38100" dir="2700000" algn="tl">
+                    <a:srgbClr val="000000"/>
+                  </a:outerShdw>
+                </a:effectLst>
+                <a:latin typeface="+mn-lt"/>
+              </a:defRPr>
+            </a:lvl9pPr>
+          </a:lstStyle>
+          <a:p>
+            <a:r>
+              <a:rPr lang="en-US" b="1" dirty="0" err="1" smtClean="0"/>
+              <a:t>Microsoft.AspNet.Server.Kestrel</a:t>
+            </a:r>
+            <a:r>
+              <a:rPr lang="en-US" b="1" dirty="0" smtClean="0"/>
+              <a:t> (Kestrel)</a:t>
+            </a:r>
+            <a:endParaRPr lang="en-US" kern="0" dirty="0" smtClean="0"/>
+          </a:p>
+          <a:p>
+            <a:pPr lvl="1"/>
+            <a:r>
+              <a:rPr lang="en-US" kern="0" dirty="0" smtClean="0"/>
+              <a:t>Non-IIS hosting (cross platform)</a:t>
+            </a:r>
+          </a:p>
+        </p:txBody>
+      </p:sp>
+    </p:spTree>
+    <p:extLst>
+      <p:ext uri="{BB962C8B-B14F-4D97-AF65-F5344CB8AC3E}">
+        <p14:creationId xmlns:p14="http://schemas.microsoft.com/office/powerpoint/2010/main" val="3449994404"/>
+      </p:ext>
+    </p:extLst>
+  </p:cSld>
+  <p:clrMapOvr>
+    <a:masterClrMapping/>
+  </p:clrMapOvr>
+  <p:transition xmlns:p14="http://schemas.microsoft.com/office/powerpoint/2010/main">
+    <p:fade/>
+  </p:transition>
+  <p:timing>
+    <p:tnLst>
+      <p:par>
+        <p:cTn xmlns:p14="http://schemas.microsoft.com/office/powerpoint/2010/main" id="1" dur="indefinite" restart="never" nodeType="tmRoot"/>
+      </p:par>
+    </p:tnLst>
+  </p:timing>
+</p:sld>
+</file>
+
+<file path=ppt/slides/slide32.xml><?xml version="1.0" encoding="utf-8"?>
+<p:sld xmlns:a="http://schemas.openxmlformats.org/drawingml/2006/main" xmlns:r="http://schemas.openxmlformats.org/officeDocument/2006/relationships" xmlns:p="http://schemas.openxmlformats.org/presentationml/2006/main">
+  <p:cSld>
+    <p:spTree>
+      <p:nvGrpSpPr>
+        <p:cNvPr id="1" name=""/>
+        <p:cNvGrpSpPr/>
+        <p:nvPr/>
+      </p:nvGrpSpPr>
+      <p:grpSpPr>
+        <a:xfrm>
+          <a:off x="0" y="0"/>
+          <a:ext cx="0" cy="0"/>
+          <a:chOff x="0" y="0"/>
+          <a:chExt cx="0" cy="0"/>
+        </a:xfrm>
+      </p:grpSpPr>
+      <p:sp>
+        <p:nvSpPr>
+          <p:cNvPr id="2" name="Title 1"/>
+          <p:cNvSpPr>
+            <a:spLocks noGrp="1"/>
+          </p:cNvSpPr>
+          <p:nvPr>
+            <p:ph type="title"/>
+          </p:nvPr>
+        </p:nvSpPr>
+        <p:spPr>
+          <a:xfrm>
+            <a:off x="381000" y="171450"/>
+            <a:ext cx="8382000" cy="769441"/>
+          </a:xfrm>
+        </p:spPr>
+        <p:txBody>
+          <a:bodyPr/>
+          <a:lstStyle/>
+          <a:p>
+            <a:r>
+              <a:rPr lang="en-US" b="1" dirty="0" smtClean="0"/>
+              <a:t>Demo</a:t>
+            </a:r>
+            <a:endParaRPr lang="en-US" b="1" dirty="0"/>
+          </a:p>
+        </p:txBody>
+      </p:sp>
+      <p:sp>
+        <p:nvSpPr>
+          <p:cNvPr id="3" name="Content Placeholder 2"/>
+          <p:cNvSpPr>
+            <a:spLocks noGrp="1"/>
+          </p:cNvSpPr>
+          <p:nvPr>
+            <p:ph idx="1"/>
+          </p:nvPr>
+        </p:nvSpPr>
+        <p:spPr>
+          <a:xfrm>
+            <a:off x="366714" y="2283210"/>
+            <a:ext cx="8410575" cy="769441"/>
+          </a:xfrm>
+        </p:spPr>
+        <p:txBody>
+          <a:bodyPr/>
+          <a:lstStyle/>
+          <a:p>
+            <a:pPr algn="ctr">
+              <a:buNone/>
+            </a:pPr>
+            <a:r>
+              <a:rPr lang="en-US" sz="4800" b="1" dirty="0" smtClean="0"/>
+              <a:t>Enough slides, let’s code.</a:t>
+            </a:r>
+            <a:endParaRPr lang="en-US" sz="2800" b="1" dirty="0" smtClean="0"/>
+          </a:p>
+        </p:txBody>
+      </p:sp>
+    </p:spTree>
+    <p:extLst>
+      <p:ext uri="{BB962C8B-B14F-4D97-AF65-F5344CB8AC3E}">
+        <p14:creationId xmlns:p14="http://schemas.microsoft.com/office/powerpoint/2010/main" val="2921785292"/>
+      </p:ext>
+    </p:extLst>
+  </p:cSld>
+  <p:clrMapOvr>
+    <a:masterClrMapping/>
+  </p:clrMapOvr>
+  <p:transition xmlns:p14="http://schemas.microsoft.com/office/powerpoint/2010/main">
+    <p:fade/>
+  </p:transition>
+  <p:timing>
+    <p:tnLst>
+      <p:par>
+        <p:cTn xmlns:p14="http://schemas.microsoft.com/office/powerpoint/2010/main" id="1" dur="indefinite" restart="never" nodeType="tmRoot"/>
+      </p:par>
+    </p:tnLst>
+  </p:timing>
+</p:sld>
+</file>
+
+<file path=ppt/slides/slide33.xml><?xml version="1.0" encoding="utf-8"?>
+<p:sld xmlns:a="http://schemas.openxmlformats.org/drawingml/2006/main" xmlns:r="http://schemas.openxmlformats.org/officeDocument/2006/relationships" xmlns:p="http://schemas.openxmlformats.org/presentationml/2006/main">
+  <p:cSld>
+    <p:spTree>
+      <p:nvGrpSpPr>
+        <p:cNvPr id="1" name=""/>
+        <p:cNvGrpSpPr/>
+        <p:nvPr/>
+      </p:nvGrpSpPr>
+      <p:grpSpPr>
+        <a:xfrm>
+          <a:off x="0" y="0"/>
+          <a:ext cx="0" cy="0"/>
+          <a:chOff x="0" y="0"/>
+          <a:chExt cx="0" cy="0"/>
+        </a:xfrm>
+      </p:grpSpPr>
+      <p:sp>
+        <p:nvSpPr>
+          <p:cNvPr id="2" name="Title 1"/>
+          <p:cNvSpPr>
+            <a:spLocks noGrp="1"/>
+          </p:cNvSpPr>
+          <p:nvPr>
+            <p:ph type="title"/>
+          </p:nvPr>
+        </p:nvSpPr>
+        <p:spPr/>
+        <p:txBody>
+          <a:bodyPr/>
+          <a:lstStyle/>
+          <a:p>
+            <a:r>
+              <a:rPr lang="en-US" b="1" dirty="0" smtClean="0"/>
+              <a:t>Thanks!</a:t>
+            </a:r>
+            <a:endParaRPr lang="en-US" b="1" dirty="0"/>
+          </a:p>
+        </p:txBody>
+      </p:sp>
+      <p:sp>
+        <p:nvSpPr>
+          <p:cNvPr id="3" name="Content Placeholder 2"/>
+          <p:cNvSpPr>
+            <a:spLocks noGrp="1"/>
+          </p:cNvSpPr>
+          <p:nvPr>
+            <p:ph idx="1"/>
+          </p:nvPr>
+        </p:nvSpPr>
+        <p:spPr>
+          <a:xfrm>
+            <a:off x="381003" y="2370926"/>
+            <a:ext cx="8410575" cy="769441"/>
+          </a:xfrm>
+        </p:spPr>
+        <p:txBody>
+          <a:bodyPr/>
+          <a:lstStyle/>
+          <a:p>
+            <a:pPr algn="ctr">
+              <a:buNone/>
+            </a:pPr>
+            <a:r>
+              <a:rPr lang="en-US" sz="4800" b="1" dirty="0" smtClean="0"/>
+              <a:t>Questions?</a:t>
+            </a:r>
+            <a:endParaRPr lang="en-US" sz="2800" b="1" dirty="0" smtClean="0"/>
+          </a:p>
+        </p:txBody>
+      </p:sp>
+    </p:spTree>
   </p:cSld>
   <p:clrMapOvr>
     <a:masterClrMapping/>

</xml_diff>